<commit_message>
Revised classroom banner image
</commit_message>
<xml_diff>
--- a/img/feature-textbooks.pptx
+++ b/img/feature-textbooks.pptx
@@ -2964,44 +2964,6 @@
           <a:chExt cx="0" cy="0"/>
         </a:xfrm>
       </p:grpSpPr>
-      <p:sp>
-        <p:nvSpPr>
-          <p:cNvPr id="2" name="Title 1"/>
-          <p:cNvSpPr>
-            <a:spLocks noGrp="1"/>
-          </p:cNvSpPr>
-          <p:nvPr>
-            <p:ph type="ctrTitle"/>
-          </p:nvPr>
-        </p:nvSpPr>
-        <p:spPr/>
-        <p:txBody>
-          <a:bodyPr/>
-          <a:lstStyle/>
-          <a:p>
-            <a:endParaRPr lang="en-CA"/>
-          </a:p>
-        </p:txBody>
-      </p:sp>
-      <p:sp>
-        <p:nvSpPr>
-          <p:cNvPr id="3" name="Subtitle 2"/>
-          <p:cNvSpPr>
-            <a:spLocks noGrp="1"/>
-          </p:cNvSpPr>
-          <p:nvPr>
-            <p:ph type="subTitle" idx="1"/>
-          </p:nvPr>
-        </p:nvSpPr>
-        <p:spPr/>
-        <p:txBody>
-          <a:bodyPr/>
-          <a:lstStyle/>
-          <a:p>
-            <a:endParaRPr lang="en-CA"/>
-          </a:p>
-        </p:txBody>
-      </p:sp>
       <p:pic>
         <p:nvPicPr>
           <p:cNvPr id="4" name="Picture 3"/>
@@ -3024,7 +2986,7 @@
         </p:blipFill>
         <p:spPr>
           <a:xfrm>
-            <a:off x="1524000" y="0"/>
+            <a:off x="1446726" y="1371881"/>
             <a:ext cx="9478698" cy="1428949"/>
           </a:xfrm>
           <a:prstGeom prst="rect">
@@ -3048,8 +3010,8 @@
         </p:blipFill>
         <p:spPr>
           <a:xfrm rot="1921978">
-            <a:off x="8867528" y="441081"/>
-            <a:ext cx="1919977" cy="1362564"/>
+            <a:off x="8778364" y="1268096"/>
+            <a:ext cx="2306003" cy="1636518"/>
           </a:xfrm>
           <a:prstGeom prst="rect">
             <a:avLst/>

</xml_diff>